<commit_message>
Edit logic sequence diagram in developer guide
</commit_message>
<xml_diff>
--- a/docs/diagrams/Diagrams.pptx
+++ b/docs/diagrams/Diagrams.pptx
@@ -115,6 +115,22 @@
       </a:defRPr>
     </a:lvl9pPr>
   </p:defaultTextStyle>
+  <p:extLst>
+    <p:ext uri="{EFAFB233-063F-42B5-8137-9DF3F51BA10A}">
+      <p15:sldGuideLst xmlns:p15="http://schemas.microsoft.com/office/powerpoint/2012/main">
+        <p15:guide id="1" orient="horz" pos="1488">
+          <p15:clr>
+            <a:srgbClr val="A4A3A4"/>
+          </p15:clr>
+        </p15:guide>
+        <p15:guide id="2" pos="2880">
+          <p15:clr>
+            <a:srgbClr val="A4A3A4"/>
+          </p15:clr>
+        </p15:guide>
+      </p15:sldGuideLst>
+    </p:ext>
+  </p:extLst>
 </p:presentation>
 </file>
 
@@ -200,7 +216,7 @@
           <a:p>
             <a:fld id="{F5CC4B3F-88C1-4FFA-B1B6-F41C21DC6924}" type="datetimeFigureOut">
               <a:rPr lang="en-US" smtClean="0"/>
-              <a:t>9/30/2016</a:t>
+              <a:t>10/12/2016</a:t>
             </a:fld>
             <a:endParaRPr lang="en-US"/>
           </a:p>
@@ -649,7 +665,7 @@
           <a:p>
             <a:fld id="{78C97017-6FC3-485B-9764-EAC9E56C1D49}" type="datetimeFigureOut">
               <a:rPr lang="en-US" smtClean="0"/>
-              <a:t>9/30/2016</a:t>
+              <a:t>10/12/2016</a:t>
             </a:fld>
             <a:endParaRPr lang="en-US"/>
           </a:p>
@@ -819,7 +835,7 @@
           <a:p>
             <a:fld id="{78C97017-6FC3-485B-9764-EAC9E56C1D49}" type="datetimeFigureOut">
               <a:rPr lang="en-US" smtClean="0"/>
-              <a:t>9/30/2016</a:t>
+              <a:t>10/12/2016</a:t>
             </a:fld>
             <a:endParaRPr lang="en-US"/>
           </a:p>
@@ -999,7 +1015,7 @@
           <a:p>
             <a:fld id="{78C97017-6FC3-485B-9764-EAC9E56C1D49}" type="datetimeFigureOut">
               <a:rPr lang="en-US" smtClean="0"/>
-              <a:t>9/30/2016</a:t>
+              <a:t>10/12/2016</a:t>
             </a:fld>
             <a:endParaRPr lang="en-US"/>
           </a:p>
@@ -1169,7 +1185,7 @@
           <a:p>
             <a:fld id="{78C97017-6FC3-485B-9764-EAC9E56C1D49}" type="datetimeFigureOut">
               <a:rPr lang="en-US" smtClean="0"/>
-              <a:t>9/30/2016</a:t>
+              <a:t>10/12/2016</a:t>
             </a:fld>
             <a:endParaRPr lang="en-US"/>
           </a:p>
@@ -1415,7 +1431,7 @@
           <a:p>
             <a:fld id="{78C97017-6FC3-485B-9764-EAC9E56C1D49}" type="datetimeFigureOut">
               <a:rPr lang="en-US" smtClean="0"/>
-              <a:t>9/30/2016</a:t>
+              <a:t>10/12/2016</a:t>
             </a:fld>
             <a:endParaRPr lang="en-US"/>
           </a:p>
@@ -1703,7 +1719,7 @@
           <a:p>
             <a:fld id="{78C97017-6FC3-485B-9764-EAC9E56C1D49}" type="datetimeFigureOut">
               <a:rPr lang="en-US" smtClean="0"/>
-              <a:t>9/30/2016</a:t>
+              <a:t>10/12/2016</a:t>
             </a:fld>
             <a:endParaRPr lang="en-US"/>
           </a:p>
@@ -2125,7 +2141,7 @@
           <a:p>
             <a:fld id="{78C97017-6FC3-485B-9764-EAC9E56C1D49}" type="datetimeFigureOut">
               <a:rPr lang="en-US" smtClean="0"/>
-              <a:t>9/30/2016</a:t>
+              <a:t>10/12/2016</a:t>
             </a:fld>
             <a:endParaRPr lang="en-US"/>
           </a:p>
@@ -2243,7 +2259,7 @@
           <a:p>
             <a:fld id="{78C97017-6FC3-485B-9764-EAC9E56C1D49}" type="datetimeFigureOut">
               <a:rPr lang="en-US" smtClean="0"/>
-              <a:t>9/30/2016</a:t>
+              <a:t>10/12/2016</a:t>
             </a:fld>
             <a:endParaRPr lang="en-US"/>
           </a:p>
@@ -2338,7 +2354,7 @@
           <a:p>
             <a:fld id="{78C97017-6FC3-485B-9764-EAC9E56C1D49}" type="datetimeFigureOut">
               <a:rPr lang="en-US" smtClean="0"/>
-              <a:t>9/30/2016</a:t>
+              <a:t>10/12/2016</a:t>
             </a:fld>
             <a:endParaRPr lang="en-US"/>
           </a:p>
@@ -2615,7 +2631,7 @@
           <a:p>
             <a:fld id="{78C97017-6FC3-485B-9764-EAC9E56C1D49}" type="datetimeFigureOut">
               <a:rPr lang="en-US" smtClean="0"/>
-              <a:t>9/30/2016</a:t>
+              <a:t>10/12/2016</a:t>
             </a:fld>
             <a:endParaRPr lang="en-US"/>
           </a:p>
@@ -2868,7 +2884,7 @@
           <a:p>
             <a:fld id="{78C97017-6FC3-485B-9764-EAC9E56C1D49}" type="datetimeFigureOut">
               <a:rPr lang="en-US" smtClean="0"/>
-              <a:t>9/30/2016</a:t>
+              <a:t>10/12/2016</a:t>
             </a:fld>
             <a:endParaRPr lang="en-US"/>
           </a:p>
@@ -3081,7 +3097,7 @@
           <a:p>
             <a:fld id="{78C97017-6FC3-485B-9764-EAC9E56C1D49}" type="datetimeFigureOut">
               <a:rPr lang="en-US" smtClean="0"/>
-              <a:t>9/30/2016</a:t>
+              <a:t>10/12/2016</a:t>
             </a:fld>
             <a:endParaRPr lang="en-US"/>
           </a:p>
@@ -5659,8 +5675,8 @@
         </p:nvSpPr>
         <p:spPr>
           <a:xfrm>
-            <a:off x="2166172" y="1453379"/>
-            <a:ext cx="1424846" cy="215444"/>
+            <a:off x="1861933" y="1453378"/>
+            <a:ext cx="1729085" cy="215444"/>
           </a:xfrm>
           <a:prstGeom prst="rect">
             <a:avLst/>
@@ -5753,7 +5769,7 @@
                   <a:srgbClr val="7030A0"/>
                 </a:solidFill>
               </a:rPr>
-              <a:t>deletePerson</a:t>
+              <a:t>deleteTask</a:t>
             </a:r>
             <a:r>
               <a:rPr lang="en-US" sz="1400" dirty="0" smtClean="0">
@@ -5811,7 +5827,7 @@
                   </a:schemeClr>
                 </a:solidFill>
               </a:rPr>
-              <a:t>AddressBookChangedEvent</a:t>
+              <a:t>TaskManagerChangedEvent</a:t>
             </a:r>
             <a:r>
               <a:rPr lang="en-US" sz="1400" dirty="0" smtClean="0">
@@ -6385,7 +6401,7 @@
                   </a:schemeClr>
                 </a:solidFill>
               </a:rPr>
-              <a:t>AddressBookChangedEvent</a:t>
+              <a:t>TaskManagerChangedEvent</a:t>
             </a:r>
             <a:r>
               <a:rPr lang="en-US" sz="1400" dirty="0" smtClean="0">
@@ -6757,7 +6773,7 @@
                   </a:schemeClr>
                 </a:solidFill>
               </a:rPr>
-              <a:t>handleAddresssBookChangedEvent</a:t>
+              <a:t>handleTaskManagerChangedEvent</a:t>
             </a:r>
             <a:r>
               <a:rPr lang="en-US" sz="1400" dirty="0" smtClean="0">
@@ -7068,7 +7084,7 @@
                   <a:srgbClr val="00B050"/>
                 </a:solidFill>
               </a:rPr>
-              <a:t>handleAddresssBookChangedEvent</a:t>
+              <a:t>handleTaskMangerChangedEvent</a:t>
             </a:r>
             <a:r>
               <a:rPr lang="en-US" sz="1400" dirty="0" smtClean="0">
@@ -12280,7 +12296,6 @@
               <a:rPr lang="en-US" dirty="0"/>
               <a:t>execute()</a:t>
             </a:r>
-            <a:endParaRPr lang="en-US" dirty="0"/>
           </a:p>
         </p:txBody>
       </p:sp>

</xml_diff>